<commit_message>
updated with Gus's comments
</commit_message>
<xml_diff>
--- a/Presentation_Slides/AME 557 Project 2 Presentation - Orbital Propagation.pptx
+++ b/Presentation_Slides/AME 557 Project 2 Presentation - Orbital Propagation.pptx
@@ -208,7 +208,7 @@
           <a:p>
             <a:fld id="{5161AEA7-BDE3-4933-ABF6-F40A6642C2BA}" type="datetimeFigureOut">
               <a:rPr lang="en-US" smtClean="0"/>
-              <a:t>11/6/2018</a:t>
+              <a:t>11/8/2018</a:t>
             </a:fld>
             <a:endParaRPr lang="en-US"/>
           </a:p>
@@ -373,7 +373,7 @@
           <a:p>
             <a:fld id="{AA723876-049D-4529-81E4-B0DA7F95CC9A}" type="datetimeFigureOut">
               <a:rPr lang="en-US" smtClean="0"/>
-              <a:t>11/6/2018</a:t>
+              <a:t>11/8/2018</a:t>
             </a:fld>
             <a:endParaRPr lang="en-US"/>
           </a:p>
@@ -2106,7 +2106,7 @@
           <a:p>
             <a:fld id="{5CD77D07-8B73-47AA-BA22-D3F09B3009AD}" type="datetimeFigureOut">
               <a:rPr lang="en-US" smtClean="0"/>
-              <a:t>11/6/2018</a:t>
+              <a:t>11/8/2018</a:t>
             </a:fld>
             <a:endParaRPr lang="en-US"/>
           </a:p>
@@ -2353,7 +2353,7 @@
           <a:p>
             <a:fld id="{5CD77D07-8B73-47AA-BA22-D3F09B3009AD}" type="datetimeFigureOut">
               <a:rPr lang="en-US" smtClean="0"/>
-              <a:t>11/6/2018</a:t>
+              <a:t>11/8/2018</a:t>
             </a:fld>
             <a:endParaRPr lang="en-US"/>
           </a:p>
@@ -2739,7 +2739,7 @@
           <a:p>
             <a:fld id="{5CD77D07-8B73-47AA-BA22-D3F09B3009AD}" type="datetimeFigureOut">
               <a:rPr lang="en-US" smtClean="0"/>
-              <a:t>11/6/2018</a:t>
+              <a:t>11/8/2018</a:t>
             </a:fld>
             <a:endParaRPr lang="en-US"/>
           </a:p>
@@ -2968,7 +2968,7 @@
           <a:p>
             <a:fld id="{5CD77D07-8B73-47AA-BA22-D3F09B3009AD}" type="datetimeFigureOut">
               <a:rPr lang="en-US" smtClean="0"/>
-              <a:t>11/6/2018</a:t>
+              <a:t>11/8/2018</a:t>
             </a:fld>
             <a:endParaRPr lang="en-US"/>
           </a:p>
@@ -3459,7 +3459,7 @@
           <a:p>
             <a:fld id="{5CD77D07-8B73-47AA-BA22-D3F09B3009AD}" type="datetimeFigureOut">
               <a:rPr lang="en-US" smtClean="0"/>
-              <a:t>11/6/2018</a:t>
+              <a:t>11/8/2018</a:t>
             </a:fld>
             <a:endParaRPr lang="en-US"/>
           </a:p>
@@ -3769,7 +3769,7 @@
           <a:p>
             <a:fld id="{5CD77D07-8B73-47AA-BA22-D3F09B3009AD}" type="datetimeFigureOut">
               <a:rPr lang="en-US" smtClean="0"/>
-              <a:t>11/6/2018</a:t>
+              <a:t>11/8/2018</a:t>
             </a:fld>
             <a:endParaRPr lang="en-US"/>
           </a:p>
@@ -4160,7 +4160,7 @@
           <a:p>
             <a:fld id="{5CD77D07-8B73-47AA-BA22-D3F09B3009AD}" type="datetimeFigureOut">
               <a:rPr lang="en-US" smtClean="0"/>
-              <a:t>11/6/2018</a:t>
+              <a:t>11/8/2018</a:t>
             </a:fld>
             <a:endParaRPr lang="en-US"/>
           </a:p>
@@ -4278,7 +4278,7 @@
           <a:p>
             <a:fld id="{5CD77D07-8B73-47AA-BA22-D3F09B3009AD}" type="datetimeFigureOut">
               <a:rPr lang="en-US" smtClean="0"/>
-              <a:t>11/6/2018</a:t>
+              <a:t>11/8/2018</a:t>
             </a:fld>
             <a:endParaRPr lang="en-US"/>
           </a:p>
@@ -4373,7 +4373,7 @@
           <a:p>
             <a:fld id="{5CD77D07-8B73-47AA-BA22-D3F09B3009AD}" type="datetimeFigureOut">
               <a:rPr lang="en-US" smtClean="0"/>
-              <a:t>11/6/2018</a:t>
+              <a:t>11/8/2018</a:t>
             </a:fld>
             <a:endParaRPr lang="en-US"/>
           </a:p>
@@ -4673,7 +4673,7 @@
           <a:p>
             <a:fld id="{5CD77D07-8B73-47AA-BA22-D3F09B3009AD}" type="datetimeFigureOut">
               <a:rPr lang="en-US" smtClean="0"/>
-              <a:t>11/6/2018</a:t>
+              <a:t>11/8/2018</a:t>
             </a:fld>
             <a:endParaRPr lang="en-US"/>
           </a:p>
@@ -4938,7 +4938,7 @@
           <a:p>
             <a:fld id="{5CD77D07-8B73-47AA-BA22-D3F09B3009AD}" type="datetimeFigureOut">
               <a:rPr lang="en-US" smtClean="0"/>
-              <a:t>11/6/2018</a:t>
+              <a:t>11/8/2018</a:t>
             </a:fld>
             <a:endParaRPr lang="en-US"/>
           </a:p>
@@ -5356,7 +5356,7 @@
           <a:p>
             <a:fld id="{5CD77D07-8B73-47AA-BA22-D3F09B3009AD}" type="datetimeFigureOut">
               <a:rPr lang="en-US" smtClean="0"/>
-              <a:t>11/6/2018</a:t>
+              <a:t>11/8/2018</a:t>
             </a:fld>
             <a:endParaRPr lang="en-US"/>
           </a:p>
@@ -6201,8 +6201,8 @@
           </a:p>
         </p:txBody>
       </p:sp>
-      <mc:AlternateContent xmlns:mc="http://schemas.openxmlformats.org/markup-compatibility/2006">
-        <mc:Choice xmlns:a14="http://schemas.microsoft.com/office/drawing/2010/main" Requires="a14">
+      <mc:AlternateContent xmlns:mc="http://schemas.openxmlformats.org/markup-compatibility/2006" xmlns:a14="http://schemas.microsoft.com/office/drawing/2010/main">
+        <mc:Choice Requires="a14">
           <p:sp>
             <p:nvSpPr>
               <p:cNvPr id="3" name="Content Placeholder 2"/>
@@ -6648,7 +6648,7 @@
             </p:txBody>
           </p:sp>
         </mc:Choice>
-        <mc:Fallback>
+        <mc:Fallback xmlns="">
           <p:sp>
             <p:nvSpPr>
               <p:cNvPr id="3" name="Content Placeholder 2"/>
@@ -6744,8 +6744,8 @@
           </a:p>
         </p:txBody>
       </p:sp>
-      <mc:AlternateContent xmlns:mc="http://schemas.openxmlformats.org/markup-compatibility/2006">
-        <mc:Choice xmlns:a14="http://schemas.microsoft.com/office/drawing/2010/main" Requires="a14">
+      <mc:AlternateContent xmlns:mc="http://schemas.openxmlformats.org/markup-compatibility/2006" xmlns:a14="http://schemas.microsoft.com/office/drawing/2010/main">
+        <mc:Choice Requires="a14">
           <p:sp>
             <p:nvSpPr>
               <p:cNvPr id="3" name="Content Placeholder 2"/>
@@ -7681,7 +7681,7 @@
             </p:txBody>
           </p:sp>
         </mc:Choice>
-        <mc:Fallback>
+        <mc:Fallback xmlns="">
           <p:sp>
             <p:nvSpPr>
               <p:cNvPr id="3" name="Content Placeholder 2"/>
@@ -7846,14 +7846,14 @@
           <p:nvPr>
             <p:extLst>
               <p:ext uri="{D42A27DB-BD31-4B8C-83A1-F6EECF244321}">
-                <p14:modId xmlns:p14="http://schemas.microsoft.com/office/powerpoint/2010/main" val="4290395314"/>
+                <p14:modId xmlns:p14="http://schemas.microsoft.com/office/powerpoint/2010/main" val="3643298269"/>
               </p:ext>
             </p:extLst>
           </p:nvPr>
         </p:nvGraphicFramePr>
         <p:xfrm>
-          <a:off x="4981983" y="3793748"/>
-          <a:ext cx="3731956" cy="1112520"/>
+          <a:off x="4981982" y="3793748"/>
+          <a:ext cx="3297951" cy="1112520"/>
         </p:xfrm>
         <a:graphic>
           <a:graphicData uri="http://schemas.openxmlformats.org/drawingml/2006/table">
@@ -7862,30 +7862,23 @@
                 <a:tableStyleId>{5940675A-B579-460E-94D1-54222C63F5DA}</a:tableStyleId>
               </a:tblPr>
               <a:tblGrid>
-                <a:gridCol w="984147">
+                <a:gridCol w="1720822">
                   <a:extLst>
                     <a:ext uri="{9D8B030D-6E8A-4147-A177-3AD203B41FA5}">
                       <a16:colId xmlns:a16="http://schemas.microsoft.com/office/drawing/2014/main" val="1785865632"/>
                     </a:ext>
                   </a:extLst>
                 </a:gridCol>
-                <a:gridCol w="1221013">
+                <a:gridCol w="1577129">
                   <a:extLst>
                     <a:ext uri="{9D8B030D-6E8A-4147-A177-3AD203B41FA5}">
                       <a16:colId xmlns:a16="http://schemas.microsoft.com/office/drawing/2014/main" val="2288258724"/>
                     </a:ext>
                   </a:extLst>
                 </a:gridCol>
-                <a:gridCol w="1526796">
-                  <a:extLst>
-                    <a:ext uri="{9D8B030D-6E8A-4147-A177-3AD203B41FA5}">
-                      <a16:colId xmlns:a16="http://schemas.microsoft.com/office/drawing/2014/main" val="2988336274"/>
-                    </a:ext>
-                  </a:extLst>
-                </a:gridCol>
               </a:tblGrid>
               <a:tr h="370840">
-                <a:tc gridSpan="3">
+                <a:tc gridSpan="2">
                   <a:txBody>
                     <a:bodyPr/>
                     <a:lstStyle/>
@@ -7913,16 +7906,6 @@
                     <a:lstStyle/>
                     <a:p>
                       <a:endParaRPr lang="en-US"/>
-                    </a:p>
-                  </a:txBody>
-                  <a:tcPr/>
-                </a:tc>
-                <a:tc hMerge="1">
-                  <a:txBody>
-                    <a:bodyPr/>
-                    <a:lstStyle/>
-                    <a:p>
-                      <a:endParaRPr lang="en-US" dirty="0"/>
                     </a:p>
                   </a:txBody>
                   <a:tcPr/>
@@ -7960,19 +7943,6 @@
                   </a:txBody>
                   <a:tcPr/>
                 </a:tc>
-                <a:tc>
-                  <a:txBody>
-                    <a:bodyPr/>
-                    <a:lstStyle/>
-                    <a:p>
-                      <a:r>
-                        <a:rPr lang="en-US" dirty="0"/>
-                        <a:t>Altitude (km)</a:t>
-                      </a:r>
-                    </a:p>
-                  </a:txBody>
-                  <a:tcPr/>
-                </a:tc>
                 <a:extLst>
                   <a:ext uri="{0D108BD9-81ED-4DB2-BD59-A6C34878D82A}">
                     <a16:rowId xmlns:a16="http://schemas.microsoft.com/office/drawing/2014/main" val="4093691599"/>
@@ -8001,19 +7971,6 @@
                       <a:r>
                         <a:rPr lang="en-US" dirty="0"/>
                         <a:t>-176.056</a:t>
-                      </a:r>
-                    </a:p>
-                  </a:txBody>
-                  <a:tcPr/>
-                </a:tc>
-                <a:tc>
-                  <a:txBody>
-                    <a:bodyPr/>
-                    <a:lstStyle/>
-                    <a:p>
-                      <a:r>
-                        <a:rPr lang="en-US" dirty="0"/>
-                        <a:t>7186.99</a:t>
                       </a:r>
                     </a:p>
                   </a:txBody>
@@ -9036,10 +8993,11 @@
                           </m:sSubPr>
                           <m:e>
                             <m:r>
-                              <a:rPr lang="en-US" sz="2100" i="1">
+                              <a:rPr lang="en-US" sz="2100" i="1" smtClean="0">
                                 <a:latin typeface="Cambria Math" panose="02040503050406030204" pitchFamily="18" charset="0"/>
+                                <a:ea typeface="Cambria Math" panose="02040503050406030204" pitchFamily="18" charset="0"/>
                               </a:rPr>
-                              <m:t>𝑝</m:t>
+                              <m:t>𝜌</m:t>
                             </m:r>
                           </m:e>
                           <m:sub>
@@ -9512,10 +9470,11 @@
                       </m:sSubPr>
                       <m:e>
                         <m:r>
-                          <a:rPr lang="en-US" sz="2100" i="1">
+                          <a:rPr lang="en-US" sz="2100" i="1" smtClean="0">
                             <a:latin typeface="Cambria Math" panose="02040503050406030204" pitchFamily="18" charset="0"/>
+                            <a:ea typeface="Cambria Math" panose="02040503050406030204" pitchFamily="18" charset="0"/>
                           </a:rPr>
-                          <m:t>𝑝</m:t>
+                          <m:t>𝜌</m:t>
                         </m:r>
                       </m:e>
                       <m:sub>
@@ -10758,7 +10717,7 @@
               <a:p>
                 <a:r>
                   <a:rPr lang="en-US" sz="1800" dirty="0"/>
-                  <a:t>Both of propagation methods show consistency with one another in regards to the predicted date of re-entry of the </a:t>
+                  <a:t>Both of the propagation methods show consistency with one another in regards to the predicted date of re-entry of the </a:t>
                 </a:r>
                 <a:r>
                   <a:rPr lang="en-US" sz="1800" dirty="0" err="1"/>
@@ -11814,29 +11773,29 @@
 </file>
 
 <file path=customXml/item1.xml><?xml version="1.0" encoding="utf-8"?>
-<sisl xmlns:xsi="http://www.w3.org/2001/XMLSchema-instance" xmlns:xsd="http://www.w3.org/2001/XMLSchema" xmlns="http://www.boldonjames.com/2008/01/sie/internal/label" sislVersion="0" policy="cde53ac1-bf5f-4aae-9cf1-07509e23a4b0" origin="userSelected"/>
-</file>
-
-<file path=customXml/item2.xml><?xml version="1.0" encoding="utf-8"?>
 <WrappedLabelHistory xmlns:xsi="http://www.w3.org/2001/XMLSchema-instance" xmlns:xsd="http://www.w3.org/2001/XMLSchema" xmlns="http://www.boldonjames.com/2016/02/Classifier/internal/wrappedLabelHistory">
   <Value>PD94bWwgdmVyc2lvbj0iMS4wIiBlbmNvZGluZz0idXMtYXNjaWkiPz48bGFiZWxIaXN0b3J5IHhtbG5zOnhzaT0iaHR0cDovL3d3dy53My5vcmcvMjAwMS9YTUxTY2hlbWEtaW5zdGFuY2UiIHhtbG5zOnhzZD0iaHR0cDovL3d3dy53My5vcmcvMjAwMS9YTUxTY2hlbWEiIHhtbG5zPSJodHRwOi8vd3d3LmJvbGRvbmphbWVzLmNvbS8yMDE2LzAyL0NsYXNzaWZpZXIvaW50ZXJuYWwvbGFiZWxIaXN0b3J5Ij48aXRlbT48c2lzbCBzaXNsVmVyc2lvbj0iMCIgcG9saWN5PSJjZGU1M2FjMS1iZjVmLTRhYWUtOWNmMS0wNzUwOWUyM2E0YjAiIG9yaWdpbj0idXNlclNlbGVjdGVkIiAvPjxVc2VyTmFtZT5VU1x6MTA4OTgyOTwvVXNlck5hbWU+PERhdGVUaW1lPjEwLzI5LzIwMTggMjowNDo1NyBQTTwvRGF0ZVRpbWU+PExhYmVsU3RyaW5nPlRoaXMgYXJ0aWZhY3QgaGFzIG5vIGNsYXNzaWZpY2F0aW9uLjwvTGFiZWxTdHJpbmc+PC9pdGVtPjwvbGFiZWxIaXN0b3J5Pg==</Value>
 </WrappedLabelHistory>
 </file>
 
+<file path=customXml/item2.xml><?xml version="1.0" encoding="utf-8"?>
+<sisl xmlns:xsi="http://www.w3.org/2001/XMLSchema-instance" xmlns:xsd="http://www.w3.org/2001/XMLSchema" xmlns="http://www.boldonjames.com/2008/01/sie/internal/label" sislVersion="0" policy="cde53ac1-bf5f-4aae-9cf1-07509e23a4b0" origin="userSelected"/>
+</file>
+
 <file path=customXml/itemProps1.xml><?xml version="1.0" encoding="utf-8"?>
+<ds:datastoreItem xmlns:ds="http://schemas.openxmlformats.org/officeDocument/2006/customXml" ds:itemID="{8F3D67F1-45F6-45F4-924E-C40296E44607}">
+  <ds:schemaRefs>
+    <ds:schemaRef ds:uri="http://www.w3.org/2001/XMLSchema"/>
+    <ds:schemaRef ds:uri="http://www.boldonjames.com/2016/02/Classifier/internal/wrappedLabelHistory"/>
+  </ds:schemaRefs>
+</ds:datastoreItem>
+</file>
+
+<file path=customXml/itemProps2.xml><?xml version="1.0" encoding="utf-8"?>
 <ds:datastoreItem xmlns:ds="http://schemas.openxmlformats.org/officeDocument/2006/customXml" ds:itemID="{CB5D6AA1-B7AF-4B5A-9A13-8D0C90707472}">
   <ds:schemaRefs>
     <ds:schemaRef ds:uri="http://www.w3.org/2001/XMLSchema"/>
     <ds:schemaRef ds:uri="http://www.boldonjames.com/2008/01/sie/internal/label"/>
   </ds:schemaRefs>
 </ds:datastoreItem>
-</file>
-
-<file path=customXml/itemProps2.xml><?xml version="1.0" encoding="utf-8"?>
-<ds:datastoreItem xmlns:ds="http://schemas.openxmlformats.org/officeDocument/2006/customXml" ds:itemID="{8F3D67F1-45F6-45F4-924E-C40296E44607}">
-  <ds:schemaRefs>
-    <ds:schemaRef ds:uri="http://www.w3.org/2001/XMLSchema"/>
-    <ds:schemaRef ds:uri="http://www.boldonjames.com/2016/02/Classifier/internal/wrappedLabelHistory"/>
-  </ds:schemaRefs>
-</ds:datastoreItem>
 </file>
</xml_diff>